<commit_message>
Update PowerPoint y documentacion
</commit_message>
<xml_diff>
--- a/Documentacion/TEMPLE BODY.pptx
+++ b/Documentacion/TEMPLE BODY.pptx
@@ -5,10 +5,10 @@
     <p:sldMasterId id="2147483757" r:id="rId1"/>
   </p:sldMasterIdLst>
   <p:notesMasterIdLst>
-    <p:notesMasterId r:id="rId16"/>
+    <p:notesMasterId r:id="rId18"/>
   </p:notesMasterIdLst>
   <p:handoutMasterIdLst>
-    <p:handoutMasterId r:id="rId17"/>
+    <p:handoutMasterId r:id="rId19"/>
   </p:handoutMasterIdLst>
   <p:sldIdLst>
     <p:sldId id="262" r:id="rId2"/>
@@ -24,7 +24,9 @@
     <p:sldId id="279" r:id="rId12"/>
     <p:sldId id="281" r:id="rId13"/>
     <p:sldId id="287" r:id="rId14"/>
-    <p:sldId id="273" r:id="rId15"/>
+    <p:sldId id="291" r:id="rId15"/>
+    <p:sldId id="292" r:id="rId16"/>
+    <p:sldId id="273" r:id="rId17"/>
   </p:sldIdLst>
   <p:sldSz cx="12192000" cy="6858000"/>
   <p:notesSz cx="6858000" cy="9144000"/>
@@ -229,7 +231,7 @@
             <a:pPr rtl="0"/>
             <a:fld id="{36733433-91C9-4F25-89C5-2049FA2AC72A}" type="datetime1">
               <a:rPr lang="es-ES" smtClean="0"/>
-              <a:t>07/06/2024</a:t>
+              <a:t>08/06/2024</a:t>
             </a:fld>
             <a:endParaRPr lang="es-ES" dirty="0"/>
           </a:p>
@@ -399,7 +401,7 @@
             <a:pPr rtl="0"/>
             <a:fld id="{0F42799A-0270-465F-BFBB-B1E8788AA761}" type="datetime1">
               <a:rPr lang="es-ES" noProof="0" smtClean="0"/>
-              <a:t>07/06/2024</a:t>
+              <a:t>08/06/2024</a:t>
             </a:fld>
             <a:endParaRPr lang="es-ES" noProof="0" dirty="0"/>
           </a:p>
@@ -1170,6 +1172,176 @@
     </p:spTree>
     <p:extLst>
       <p:ext uri="{BB962C8B-B14F-4D97-AF65-F5344CB8AC3E}">
+        <p14:creationId xmlns:p14="http://schemas.microsoft.com/office/powerpoint/2010/main" val="1744311673"/>
+      </p:ext>
+    </p:extLst>
+  </p:cSld>
+  <p:clrMapOvr>
+    <a:masterClrMapping/>
+  </p:clrMapOvr>
+</p:notes>
+</file>
+
+<file path=ppt/notesSlides/notesSlide15.xml><?xml version="1.0" encoding="utf-8"?>
+<p:notes xmlns:a="http://schemas.openxmlformats.org/drawingml/2006/main" xmlns:r="http://schemas.openxmlformats.org/officeDocument/2006/relationships" xmlns:p="http://schemas.openxmlformats.org/presentationml/2006/main">
+  <p:cSld>
+    <p:spTree>
+      <p:nvGrpSpPr>
+        <p:cNvPr id="1" name=""/>
+        <p:cNvGrpSpPr/>
+        <p:nvPr/>
+      </p:nvGrpSpPr>
+      <p:grpSpPr>
+        <a:xfrm>
+          <a:off x="0" y="0"/>
+          <a:ext cx="0" cy="0"/>
+          <a:chOff x="0" y="0"/>
+          <a:chExt cx="0" cy="0"/>
+        </a:xfrm>
+      </p:grpSpPr>
+      <p:sp>
+        <p:nvSpPr>
+          <p:cNvPr id="2" name="Marcador de imagen de diapositiva 1"/>
+          <p:cNvSpPr>
+            <a:spLocks noGrp="1" noRot="1" noChangeAspect="1"/>
+          </p:cNvSpPr>
+          <p:nvPr>
+            <p:ph type="sldImg"/>
+          </p:nvPr>
+        </p:nvSpPr>
+        <p:spPr/>
+      </p:sp>
+      <p:sp>
+        <p:nvSpPr>
+          <p:cNvPr id="3" name="Marcador de notas 2"/>
+          <p:cNvSpPr>
+            <a:spLocks noGrp="1"/>
+          </p:cNvSpPr>
+          <p:nvPr>
+            <p:ph type="body" idx="1"/>
+          </p:nvPr>
+        </p:nvSpPr>
+        <p:spPr/>
+        <p:txBody>
+          <a:bodyPr/>
+          <a:lstStyle/>
+          <a:p>
+            <a:endParaRPr lang="es-ES" dirty="0"/>
+          </a:p>
+        </p:txBody>
+      </p:sp>
+      <p:sp>
+        <p:nvSpPr>
+          <p:cNvPr id="4" name="Marcador de número de diapositiva 3"/>
+          <p:cNvSpPr>
+            <a:spLocks noGrp="1"/>
+          </p:cNvSpPr>
+          <p:nvPr>
+            <p:ph type="sldNum" sz="quarter" idx="10"/>
+          </p:nvPr>
+        </p:nvSpPr>
+        <p:spPr/>
+        <p:txBody>
+          <a:bodyPr/>
+          <a:lstStyle/>
+          <a:p>
+            <a:pPr rtl="0"/>
+            <a:fld id="{FC8BD8E7-1312-41F3-99C4-6DA5AF891969}" type="slidenum">
+              <a:rPr lang="es-ES" smtClean="0"/>
+              <a:t>15</a:t>
+            </a:fld>
+            <a:endParaRPr lang="es-ES" dirty="0"/>
+          </a:p>
+        </p:txBody>
+      </p:sp>
+    </p:spTree>
+    <p:extLst>
+      <p:ext uri="{BB962C8B-B14F-4D97-AF65-F5344CB8AC3E}">
+        <p14:creationId xmlns:p14="http://schemas.microsoft.com/office/powerpoint/2010/main" val="1022945318"/>
+      </p:ext>
+    </p:extLst>
+  </p:cSld>
+  <p:clrMapOvr>
+    <a:masterClrMapping/>
+  </p:clrMapOvr>
+</p:notes>
+</file>
+
+<file path=ppt/notesSlides/notesSlide16.xml><?xml version="1.0" encoding="utf-8"?>
+<p:notes xmlns:a="http://schemas.openxmlformats.org/drawingml/2006/main" xmlns:r="http://schemas.openxmlformats.org/officeDocument/2006/relationships" xmlns:p="http://schemas.openxmlformats.org/presentationml/2006/main">
+  <p:cSld>
+    <p:spTree>
+      <p:nvGrpSpPr>
+        <p:cNvPr id="1" name=""/>
+        <p:cNvGrpSpPr/>
+        <p:nvPr/>
+      </p:nvGrpSpPr>
+      <p:grpSpPr>
+        <a:xfrm>
+          <a:off x="0" y="0"/>
+          <a:ext cx="0" cy="0"/>
+          <a:chOff x="0" y="0"/>
+          <a:chExt cx="0" cy="0"/>
+        </a:xfrm>
+      </p:grpSpPr>
+      <p:sp>
+        <p:nvSpPr>
+          <p:cNvPr id="2" name="Marcador de imagen de diapositiva 1"/>
+          <p:cNvSpPr>
+            <a:spLocks noGrp="1" noRot="1" noChangeAspect="1"/>
+          </p:cNvSpPr>
+          <p:nvPr>
+            <p:ph type="sldImg"/>
+          </p:nvPr>
+        </p:nvSpPr>
+        <p:spPr/>
+      </p:sp>
+      <p:sp>
+        <p:nvSpPr>
+          <p:cNvPr id="3" name="Marcador de notas 2"/>
+          <p:cNvSpPr>
+            <a:spLocks noGrp="1"/>
+          </p:cNvSpPr>
+          <p:nvPr>
+            <p:ph type="body" idx="1"/>
+          </p:nvPr>
+        </p:nvSpPr>
+        <p:spPr/>
+        <p:txBody>
+          <a:bodyPr/>
+          <a:lstStyle/>
+          <a:p>
+            <a:endParaRPr lang="es-ES" dirty="0"/>
+          </a:p>
+        </p:txBody>
+      </p:sp>
+      <p:sp>
+        <p:nvSpPr>
+          <p:cNvPr id="4" name="Marcador de número de diapositiva 3"/>
+          <p:cNvSpPr>
+            <a:spLocks noGrp="1"/>
+          </p:cNvSpPr>
+          <p:nvPr>
+            <p:ph type="sldNum" sz="quarter" idx="10"/>
+          </p:nvPr>
+        </p:nvSpPr>
+        <p:spPr/>
+        <p:txBody>
+          <a:bodyPr/>
+          <a:lstStyle/>
+          <a:p>
+            <a:pPr rtl="0"/>
+            <a:fld id="{FC8BD8E7-1312-41F3-99C4-6DA5AF891969}" type="slidenum">
+              <a:rPr lang="es-ES" smtClean="0"/>
+              <a:t>16</a:t>
+            </a:fld>
+            <a:endParaRPr lang="es-ES" dirty="0"/>
+          </a:p>
+        </p:txBody>
+      </p:sp>
+    </p:spTree>
+    <p:extLst>
+      <p:ext uri="{BB962C8B-B14F-4D97-AF65-F5344CB8AC3E}">
         <p14:creationId xmlns:p14="http://schemas.microsoft.com/office/powerpoint/2010/main" val="3811988589"/>
       </p:ext>
     </p:extLst>
@@ -2048,7 +2220,7 @@
           <a:p>
             <a:fld id="{ADA5217B-C461-4E0A-B4E4-B5A6F1D99B01}" type="datetimeFigureOut">
               <a:rPr lang="es-ES" smtClean="0"/>
-              <a:t>07/06/2024</a:t>
+              <a:t>08/06/2024</a:t>
             </a:fld>
             <a:endParaRPr lang="es-ES"/>
           </a:p>
@@ -2452,7 +2624,7 @@
             <a:pPr rtl="0"/>
             <a:fld id="{5E879E85-5BBE-4DC3-949C-B551255CCB64}" type="datetime1">
               <a:rPr lang="es-ES" noProof="0" smtClean="0"/>
-              <a:t>07/06/2024</a:t>
+              <a:t>08/06/2024</a:t>
             </a:fld>
             <a:endParaRPr lang="es-ES" noProof="0" dirty="0"/>
           </a:p>
@@ -2862,7 +3034,7 @@
             <a:pPr rtl="0"/>
             <a:fld id="{5E879E85-5BBE-4DC3-949C-B551255CCB64}" type="datetime1">
               <a:rPr lang="es-ES" noProof="0" smtClean="0"/>
-              <a:t>07/06/2024</a:t>
+              <a:t>08/06/2024</a:t>
             </a:fld>
             <a:endParaRPr lang="es-ES" noProof="0" dirty="0"/>
           </a:p>
@@ -3207,7 +3379,7 @@
             <a:pPr rtl="0"/>
             <a:fld id="{5E879E85-5BBE-4DC3-949C-B551255CCB64}" type="datetime1">
               <a:rPr lang="es-ES" noProof="0" smtClean="0"/>
-              <a:t>07/06/2024</a:t>
+              <a:t>08/06/2024</a:t>
             </a:fld>
             <a:endParaRPr lang="es-ES" noProof="0" dirty="0"/>
           </a:p>
@@ -3536,7 +3708,7 @@
             <a:pPr rtl="0"/>
             <a:fld id="{5E879E85-5BBE-4DC3-949C-B551255CCB64}" type="datetime1">
               <a:rPr lang="es-ES" noProof="0" smtClean="0"/>
-              <a:t>07/06/2024</a:t>
+              <a:t>08/06/2024</a:t>
             </a:fld>
             <a:endParaRPr lang="es-ES" noProof="0" dirty="0"/>
           </a:p>
@@ -3941,7 +4113,7 @@
             <a:pPr rtl="0"/>
             <a:fld id="{5E879E85-5BBE-4DC3-949C-B551255CCB64}" type="datetime1">
               <a:rPr lang="es-ES" noProof="0" smtClean="0"/>
-              <a:t>07/06/2024</a:t>
+              <a:t>08/06/2024</a:t>
             </a:fld>
             <a:endParaRPr lang="es-ES" noProof="0" dirty="0"/>
           </a:p>
@@ -4207,7 +4379,7 @@
             <a:pPr rtl="0"/>
             <a:fld id="{A49C5101-B6E1-4C2F-96CC-D4D7C5FEAAF7}" type="datetime1">
               <a:rPr lang="es-ES" noProof="0" smtClean="0"/>
-              <a:t>07/06/2024</a:t>
+              <a:t>08/06/2024</a:t>
             </a:fld>
             <a:endParaRPr lang="es-ES" noProof="0" dirty="0"/>
           </a:p>
@@ -4488,7 +4660,7 @@
             <a:pPr rtl="0"/>
             <a:fld id="{AE3F2578-7180-4CCB-9A96-7D1B03AD95AA}" type="datetime1">
               <a:rPr lang="es-ES" noProof="0" smtClean="0"/>
-              <a:t>07/06/2024</a:t>
+              <a:t>08/06/2024</a:t>
             </a:fld>
             <a:endParaRPr lang="es-ES" noProof="0" dirty="0"/>
           </a:p>
@@ -5392,7 +5564,7 @@
             <a:pPr rtl="0"/>
             <a:fld id="{5E879E85-5BBE-4DC3-949C-B551255CCB64}" type="datetime1">
               <a:rPr lang="es-ES" noProof="0" smtClean="0"/>
-              <a:t>07/06/2024</a:t>
+              <a:t>08/06/2024</a:t>
             </a:fld>
             <a:endParaRPr lang="es-ES" noProof="0" dirty="0"/>
           </a:p>
@@ -5730,7 +5902,7 @@
             <a:pPr rtl="0"/>
             <a:fld id="{5E879E85-5BBE-4DC3-949C-B551255CCB64}" type="datetime1">
               <a:rPr lang="es-ES" noProof="0" smtClean="0"/>
-              <a:t>07/06/2024</a:t>
+              <a:t>08/06/2024</a:t>
             </a:fld>
             <a:endParaRPr lang="es-ES" noProof="0" dirty="0"/>
           </a:p>
@@ -6062,7 +6234,7 @@
             <a:pPr rtl="0"/>
             <a:fld id="{28D2FC1E-83DA-4E03-9666-93C59D8ACCEA}" type="datetime1">
               <a:rPr lang="es-ES" noProof="0" smtClean="0"/>
-              <a:t>07/06/2024</a:t>
+              <a:t>08/06/2024</a:t>
             </a:fld>
             <a:endParaRPr lang="es-ES" noProof="0" dirty="0"/>
           </a:p>
@@ -6538,7 +6710,7 @@
             <a:pPr rtl="0"/>
             <a:fld id="{CA1153A9-469E-4B41-9F8D-6E09C4AFB7F0}" type="datetime1">
               <a:rPr lang="es-ES" noProof="0" smtClean="0"/>
-              <a:t>07/06/2024</a:t>
+              <a:t>08/06/2024</a:t>
             </a:fld>
             <a:endParaRPr lang="es-ES" noProof="0" dirty="0"/>
           </a:p>
@@ -6762,7 +6934,7 @@
             <a:pPr rtl="0"/>
             <a:fld id="{C9ADA510-67ED-4878-A088-E9242C8AA6FD}" type="datetime1">
               <a:rPr lang="es-ES" noProof="0" smtClean="0"/>
-              <a:t>07/06/2024</a:t>
+              <a:t>08/06/2024</a:t>
             </a:fld>
             <a:endParaRPr lang="es-ES" noProof="0" dirty="0"/>
           </a:p>
@@ -6957,7 +7129,7 @@
           <a:p>
             <a:fld id="{ADA5217B-C461-4E0A-B4E4-B5A6F1D99B01}" type="datetimeFigureOut">
               <a:rPr lang="es-ES" smtClean="0"/>
-              <a:t>07/06/2024</a:t>
+              <a:t>08/06/2024</a:t>
             </a:fld>
             <a:endParaRPr lang="es-ES"/>
           </a:p>
@@ -7303,7 +7475,7 @@
             <a:pPr rtl="0"/>
             <a:fld id="{5E879E85-5BBE-4DC3-949C-B551255CCB64}" type="datetime1">
               <a:rPr lang="es-ES" noProof="0" smtClean="0"/>
-              <a:t>07/06/2024</a:t>
+              <a:t>08/06/2024</a:t>
             </a:fld>
             <a:endParaRPr lang="es-ES" noProof="0" dirty="0"/>
           </a:p>
@@ -7657,7 +7829,7 @@
             <a:pPr rtl="0"/>
             <a:fld id="{5E879E85-5BBE-4DC3-949C-B551255CCB64}" type="datetime1">
               <a:rPr lang="es-ES" noProof="0" smtClean="0"/>
-              <a:t>07/06/2024</a:t>
+              <a:t>08/06/2024</a:t>
             </a:fld>
             <a:endParaRPr lang="es-ES" noProof="0" dirty="0"/>
           </a:p>
@@ -9783,7 +9955,7 @@
             <a:pPr rtl="0"/>
             <a:fld id="{5E879E85-5BBE-4DC3-949C-B551255CCB64}" type="datetime1">
               <a:rPr lang="es-ES" noProof="0" smtClean="0"/>
-              <a:t>07/06/2024</a:t>
+              <a:t>08/06/2024</a:t>
             </a:fld>
             <a:endParaRPr lang="es-ES" noProof="0" dirty="0"/>
           </a:p>
@@ -11286,6 +11458,565 @@
 <file path=ppt/slides/slide14.xml><?xml version="1.0" encoding="utf-8"?>
 <p:sld xmlns:a="http://schemas.openxmlformats.org/drawingml/2006/main" xmlns:r="http://schemas.openxmlformats.org/officeDocument/2006/relationships" xmlns:p="http://schemas.openxmlformats.org/presentationml/2006/main">
   <p:cSld>
+    <p:bg>
+      <p:bgPr>
+        <a:solidFill>
+          <a:schemeClr val="tx1"/>
+        </a:solidFill>
+        <a:effectLst/>
+      </p:bgPr>
+    </p:bg>
+    <p:spTree>
+      <p:nvGrpSpPr>
+        <p:cNvPr id="1" name=""/>
+        <p:cNvGrpSpPr/>
+        <p:nvPr/>
+      </p:nvGrpSpPr>
+      <p:grpSpPr>
+        <a:xfrm>
+          <a:off x="0" y="0"/>
+          <a:ext cx="0" cy="0"/>
+          <a:chOff x="0" y="0"/>
+          <a:chExt cx="0" cy="0"/>
+        </a:xfrm>
+      </p:grpSpPr>
+      <p:sp>
+        <p:nvSpPr>
+          <p:cNvPr id="2" name="Título 1"/>
+          <p:cNvSpPr>
+            <a:spLocks noGrp="1"/>
+          </p:cNvSpPr>
+          <p:nvPr>
+            <p:ph type="title"/>
+          </p:nvPr>
+        </p:nvSpPr>
+        <p:spPr>
+          <a:xfrm>
+            <a:off x="1819201" y="534933"/>
+            <a:ext cx="8911687" cy="1280890"/>
+          </a:xfrm>
+        </p:spPr>
+        <p:txBody>
+          <a:bodyPr rtlCol="0"/>
+          <a:lstStyle/>
+          <a:p>
+            <a:pPr algn="ctr"/>
+            <a:r>
+              <a:rPr lang="es-ES" dirty="0">
+                <a:solidFill>
+                  <a:srgbClr val="FFFF00"/>
+                </a:solidFill>
+              </a:rPr>
+              <a:t>Demostración de la APP</a:t>
+            </a:r>
+          </a:p>
+        </p:txBody>
+      </p:sp>
+      <p:sp>
+        <p:nvSpPr>
+          <p:cNvPr id="3" name="Marcador de posición de contenido 2"/>
+          <p:cNvSpPr>
+            <a:spLocks noGrp="1"/>
+          </p:cNvSpPr>
+          <p:nvPr>
+            <p:ph sz="half" idx="1"/>
+          </p:nvPr>
+        </p:nvSpPr>
+        <p:spPr>
+          <a:xfrm>
+            <a:off x="5076473" y="2545445"/>
+            <a:ext cx="4313864" cy="3777622"/>
+          </a:xfrm>
+        </p:spPr>
+        <p:txBody>
+          <a:bodyPr rtlCol="0">
+            <a:normAutofit/>
+          </a:bodyPr>
+          <a:lstStyle/>
+          <a:p>
+            <a:r>
+              <a:rPr lang="es-ES" sz="2500" dirty="0">
+                <a:solidFill>
+                  <a:schemeClr val="bg1"/>
+                </a:solidFill>
+                <a:latin typeface="Baskerville"/>
+              </a:rPr>
+              <a:t>Funcionalidad</a:t>
+            </a:r>
+          </a:p>
+          <a:p>
+            <a:r>
+              <a:rPr lang="es-ES" sz="2500" dirty="0">
+                <a:solidFill>
+                  <a:schemeClr val="bg1"/>
+                </a:solidFill>
+                <a:latin typeface="Baskerville"/>
+              </a:rPr>
+              <a:t>Vistas</a:t>
+            </a:r>
+          </a:p>
+          <a:p>
+            <a:r>
+              <a:rPr lang="es-ES" sz="2500" dirty="0">
+                <a:solidFill>
+                  <a:schemeClr val="bg1"/>
+                </a:solidFill>
+                <a:latin typeface="Baskerville"/>
+              </a:rPr>
+              <a:t>Elementos</a:t>
+            </a:r>
+          </a:p>
+          <a:p>
+            <a:endParaRPr lang="es-ES" sz="2500" dirty="0">
+              <a:solidFill>
+                <a:schemeClr val="bg1"/>
+              </a:solidFill>
+              <a:latin typeface="Baskerville"/>
+            </a:endParaRPr>
+          </a:p>
+        </p:txBody>
+      </p:sp>
+      <p:pic>
+        <p:nvPicPr>
+          <p:cNvPr id="4" name="Imagen 3">
+            <a:extLst>
+              <a:ext uri="{FF2B5EF4-FFF2-40B4-BE49-F238E27FC236}">
+                <a16:creationId xmlns:a16="http://schemas.microsoft.com/office/drawing/2014/main" id="{A8638FE3-038F-38AE-0F4F-971965556F32}"/>
+              </a:ext>
+            </a:extLst>
+          </p:cNvPr>
+          <p:cNvPicPr>
+            <a:picLocks noChangeAspect="1"/>
+          </p:cNvPicPr>
+          <p:nvPr/>
+        </p:nvPicPr>
+        <p:blipFill>
+          <a:blip r:embed="rId3"/>
+          <a:stretch>
+            <a:fillRect/>
+          </a:stretch>
+        </p:blipFill>
+        <p:spPr>
+          <a:xfrm>
+            <a:off x="1692886" y="1225827"/>
+            <a:ext cx="2246884" cy="5008063"/>
+          </a:xfrm>
+          <a:prstGeom prst="rect">
+            <a:avLst/>
+          </a:prstGeom>
+        </p:spPr>
+      </p:pic>
+    </p:spTree>
+    <p:extLst>
+      <p:ext uri="{BB962C8B-B14F-4D97-AF65-F5344CB8AC3E}">
+        <p14:creationId xmlns:p14="http://schemas.microsoft.com/office/powerpoint/2010/main" val="3960457825"/>
+      </p:ext>
+    </p:extLst>
+  </p:cSld>
+  <p:clrMapOvr>
+    <a:masterClrMapping/>
+  </p:clrMapOvr>
+  <mc:AlternateContent xmlns:mc="http://schemas.openxmlformats.org/markup-compatibility/2006">
+    <mc:Choice xmlns:p14="http://schemas.microsoft.com/office/powerpoint/2010/main" Requires="p14">
+      <p:transition spd="med" p14:dur="700">
+        <p:fade/>
+      </p:transition>
+    </mc:Choice>
+    <mc:Fallback>
+      <p:transition spd="med">
+        <p:fade/>
+      </p:transition>
+    </mc:Fallback>
+  </mc:AlternateContent>
+</p:sld>
+</file>
+
+<file path=ppt/slides/slide15.xml><?xml version="1.0" encoding="utf-8"?>
+<p:sld xmlns:a="http://schemas.openxmlformats.org/drawingml/2006/main" xmlns:r="http://schemas.openxmlformats.org/officeDocument/2006/relationships" xmlns:p="http://schemas.openxmlformats.org/presentationml/2006/main">
+  <p:cSld>
+    <p:bg>
+      <p:bgPr>
+        <a:solidFill>
+          <a:schemeClr val="tx1"/>
+        </a:solidFill>
+        <a:effectLst/>
+      </p:bgPr>
+    </p:bg>
+    <p:spTree>
+      <p:nvGrpSpPr>
+        <p:cNvPr id="1" name=""/>
+        <p:cNvGrpSpPr/>
+        <p:nvPr/>
+      </p:nvGrpSpPr>
+      <p:grpSpPr>
+        <a:xfrm>
+          <a:off x="0" y="0"/>
+          <a:ext cx="0" cy="0"/>
+          <a:chOff x="0" y="0"/>
+          <a:chExt cx="0" cy="0"/>
+        </a:xfrm>
+      </p:grpSpPr>
+      <p:sp>
+        <p:nvSpPr>
+          <p:cNvPr id="2" name="Título 1"/>
+          <p:cNvSpPr>
+            <a:spLocks noGrp="1"/>
+          </p:cNvSpPr>
+          <p:nvPr>
+            <p:ph type="title"/>
+          </p:nvPr>
+        </p:nvSpPr>
+        <p:spPr>
+          <a:xfrm>
+            <a:off x="1819201" y="534933"/>
+            <a:ext cx="8911687" cy="1280890"/>
+          </a:xfrm>
+        </p:spPr>
+        <p:txBody>
+          <a:bodyPr rtlCol="0"/>
+          <a:lstStyle/>
+          <a:p>
+            <a:pPr algn="ctr"/>
+            <a:r>
+              <a:rPr lang="es-ES" dirty="0">
+                <a:solidFill>
+                  <a:srgbClr val="FFFF00"/>
+                </a:solidFill>
+              </a:rPr>
+              <a:t>Implantaciones futuras</a:t>
+            </a:r>
+          </a:p>
+        </p:txBody>
+      </p:sp>
+      <p:sp>
+        <p:nvSpPr>
+          <p:cNvPr id="3" name="Marcador de posición de contenido 2"/>
+          <p:cNvSpPr>
+            <a:spLocks noGrp="1"/>
+          </p:cNvSpPr>
+          <p:nvPr>
+            <p:ph sz="half" idx="1"/>
+          </p:nvPr>
+        </p:nvSpPr>
+        <p:spPr>
+          <a:xfrm>
+            <a:off x="2473950" y="1402445"/>
+            <a:ext cx="8155950" cy="3125593"/>
+          </a:xfrm>
+        </p:spPr>
+        <p:txBody>
+          <a:bodyPr rtlCol="0">
+            <a:normAutofit/>
+          </a:bodyPr>
+          <a:lstStyle/>
+          <a:p>
+            <a:r>
+              <a:rPr lang="es-ES" sz="2500" dirty="0">
+                <a:solidFill>
+                  <a:schemeClr val="bg1"/>
+                </a:solidFill>
+                <a:latin typeface="Baskerville"/>
+              </a:rPr>
+              <a:t>Uso de tarjetas NFC para almacenar datos de usuario</a:t>
+            </a:r>
+          </a:p>
+          <a:p>
+            <a:r>
+              <a:rPr lang="es-ES" sz="2500" dirty="0">
+                <a:solidFill>
+                  <a:schemeClr val="bg1"/>
+                </a:solidFill>
+                <a:latin typeface="Baskerville"/>
+              </a:rPr>
+              <a:t>Integración con aplicaciones para llevar alimentación y conteo de </a:t>
+            </a:r>
+            <a:r>
+              <a:rPr lang="es-ES" sz="2500" dirty="0" err="1">
+                <a:solidFill>
+                  <a:schemeClr val="bg1"/>
+                </a:solidFill>
+                <a:latin typeface="Baskerville"/>
+              </a:rPr>
+              <a:t>calorias</a:t>
+            </a:r>
+            <a:endParaRPr lang="es-ES" sz="2500" dirty="0">
+              <a:solidFill>
+                <a:schemeClr val="bg1"/>
+              </a:solidFill>
+              <a:latin typeface="Baskerville"/>
+            </a:endParaRPr>
+          </a:p>
+          <a:p>
+            <a:r>
+              <a:rPr lang="es-ES" sz="2500" dirty="0">
+                <a:solidFill>
+                  <a:schemeClr val="bg1"/>
+                </a:solidFill>
+                <a:latin typeface="Baskerville"/>
+              </a:rPr>
+              <a:t>Integración con redes sociales</a:t>
+            </a:r>
+          </a:p>
+          <a:p>
+            <a:r>
+              <a:rPr lang="es-ES" sz="2500" dirty="0">
+                <a:solidFill>
+                  <a:schemeClr val="bg1"/>
+                </a:solidFill>
+                <a:latin typeface="Baskerville"/>
+              </a:rPr>
+              <a:t>Coaching personalizado basado en IA</a:t>
+            </a:r>
+          </a:p>
+        </p:txBody>
+      </p:sp>
+      <p:pic>
+        <p:nvPicPr>
+          <p:cNvPr id="1026" name="Picture 2" descr="NFC en el móvil: qué es, para qué sirve y siete usos para sacarle todo el  partido">
+            <a:extLst>
+              <a:ext uri="{FF2B5EF4-FFF2-40B4-BE49-F238E27FC236}">
+                <a16:creationId xmlns:a16="http://schemas.microsoft.com/office/drawing/2014/main" id="{593249AA-3DF5-5115-DFCD-5E6432156B21}"/>
+              </a:ext>
+            </a:extLst>
+          </p:cNvPr>
+          <p:cNvPicPr>
+            <a:picLocks noChangeAspect="1" noChangeArrowheads="1"/>
+          </p:cNvPicPr>
+          <p:nvPr/>
+        </p:nvPicPr>
+        <p:blipFill>
+          <a:blip r:embed="rId3">
+            <a:extLst>
+              <a:ext uri="{28A0092B-C50C-407E-A947-70E740481C1C}">
+                <a14:useLocalDpi xmlns:a14="http://schemas.microsoft.com/office/drawing/2010/main" val="0"/>
+              </a:ext>
+            </a:extLst>
+          </a:blip>
+          <a:srcRect/>
+          <a:stretch>
+            <a:fillRect/>
+          </a:stretch>
+        </p:blipFill>
+        <p:spPr bwMode="auto">
+          <a:xfrm>
+            <a:off x="363161" y="4168655"/>
+            <a:ext cx="3195585" cy="2258524"/>
+          </a:xfrm>
+          <a:prstGeom prst="rect">
+            <a:avLst/>
+          </a:prstGeom>
+          <a:noFill/>
+          <a:extLst>
+            <a:ext uri="{909E8E84-426E-40DD-AFC4-6F175D3DCCD1}">
+              <a14:hiddenFill xmlns:a14="http://schemas.microsoft.com/office/drawing/2010/main">
+                <a:solidFill>
+                  <a:srgbClr val="FFFFFF"/>
+                </a:solidFill>
+              </a14:hiddenFill>
+            </a:ext>
+          </a:extLst>
+        </p:spPr>
+      </p:pic>
+      <p:pic>
+        <p:nvPicPr>
+          <p:cNvPr id="1028" name="Picture 4" descr="Qué son los datos de entrenamiento de IA 2024? (Beneficios, desafíos,  ejemplos y conjuntos de datos)">
+            <a:extLst>
+              <a:ext uri="{FF2B5EF4-FFF2-40B4-BE49-F238E27FC236}">
+                <a16:creationId xmlns:a16="http://schemas.microsoft.com/office/drawing/2014/main" id="{F042B0ED-A62C-23F8-8C4F-2E322627F000}"/>
+              </a:ext>
+            </a:extLst>
+          </p:cNvPr>
+          <p:cNvPicPr>
+            <a:picLocks noChangeAspect="1" noChangeArrowheads="1"/>
+          </p:cNvPicPr>
+          <p:nvPr/>
+        </p:nvPicPr>
+        <p:blipFill>
+          <a:blip r:embed="rId4">
+            <a:extLst>
+              <a:ext uri="{28A0092B-C50C-407E-A947-70E740481C1C}">
+                <a14:useLocalDpi xmlns:a14="http://schemas.microsoft.com/office/drawing/2010/main" val="0"/>
+              </a:ext>
+            </a:extLst>
+          </a:blip>
+          <a:srcRect/>
+          <a:stretch>
+            <a:fillRect/>
+          </a:stretch>
+        </p:blipFill>
+        <p:spPr bwMode="auto">
+          <a:xfrm>
+            <a:off x="3750756" y="4476001"/>
+            <a:ext cx="4441001" cy="1839097"/>
+          </a:xfrm>
+          <a:prstGeom prst="rect">
+            <a:avLst/>
+          </a:prstGeom>
+          <a:noFill/>
+          <a:extLst>
+            <a:ext uri="{909E8E84-426E-40DD-AFC4-6F175D3DCCD1}">
+              <a14:hiddenFill xmlns:a14="http://schemas.microsoft.com/office/drawing/2010/main">
+                <a:solidFill>
+                  <a:srgbClr val="FFFFFF"/>
+                </a:solidFill>
+              </a14:hiddenFill>
+            </a:ext>
+          </a:extLst>
+        </p:spPr>
+      </p:pic>
+      <p:pic>
+        <p:nvPicPr>
+          <p:cNvPr id="5" name="Marcador de posición de imagen 5">
+            <a:extLst>
+              <a:ext uri="{FF2B5EF4-FFF2-40B4-BE49-F238E27FC236}">
+                <a16:creationId xmlns:a16="http://schemas.microsoft.com/office/drawing/2014/main" id="{508D2B8A-D201-5088-D53D-5BA8CE69E4F4}"/>
+              </a:ext>
+            </a:extLst>
+          </p:cNvPr>
+          <p:cNvPicPr>
+            <a:picLocks noChangeAspect="1"/>
+          </p:cNvPicPr>
+          <p:nvPr/>
+        </p:nvPicPr>
+        <p:blipFill>
+          <a:blip r:embed="rId5"/>
+          <a:srcRect t="8926" b="8926"/>
+          <a:stretch>
+            <a:fillRect/>
+          </a:stretch>
+        </p:blipFill>
+        <p:spPr>
+          <a:xfrm>
+            <a:off x="5660430" y="5175619"/>
+            <a:ext cx="495239" cy="559872"/>
+          </a:xfrm>
+          <a:prstGeom prst="rect">
+            <a:avLst/>
+          </a:prstGeom>
+        </p:spPr>
+      </p:pic>
+      <p:pic>
+        <p:nvPicPr>
+          <p:cNvPr id="1030" name="Picture 6" descr="8 mejores apps para contar calorías y medir las que quemas (2023)">
+            <a:extLst>
+              <a:ext uri="{FF2B5EF4-FFF2-40B4-BE49-F238E27FC236}">
+                <a16:creationId xmlns:a16="http://schemas.microsoft.com/office/drawing/2014/main" id="{C0D2E6C9-276D-133C-9BA9-90D30184C5B7}"/>
+              </a:ext>
+            </a:extLst>
+          </p:cNvPr>
+          <p:cNvPicPr>
+            <a:picLocks noChangeAspect="1" noChangeArrowheads="1"/>
+          </p:cNvPicPr>
+          <p:nvPr/>
+        </p:nvPicPr>
+        <p:blipFill>
+          <a:blip r:embed="rId6" cstate="print">
+            <a:extLst>
+              <a:ext uri="{28A0092B-C50C-407E-A947-70E740481C1C}">
+                <a14:useLocalDpi xmlns:a14="http://schemas.microsoft.com/office/drawing/2010/main" val="0"/>
+              </a:ext>
+            </a:extLst>
+          </a:blip>
+          <a:srcRect/>
+          <a:stretch>
+            <a:fillRect/>
+          </a:stretch>
+        </p:blipFill>
+        <p:spPr bwMode="auto">
+          <a:xfrm>
+            <a:off x="9126580" y="2683335"/>
+            <a:ext cx="2562911" cy="1648812"/>
+          </a:xfrm>
+          <a:prstGeom prst="rect">
+            <a:avLst/>
+          </a:prstGeom>
+          <a:noFill/>
+          <a:extLst>
+            <a:ext uri="{909E8E84-426E-40DD-AFC4-6F175D3DCCD1}">
+              <a14:hiddenFill xmlns:a14="http://schemas.microsoft.com/office/drawing/2010/main">
+                <a:solidFill>
+                  <a:srgbClr val="FFFFFF"/>
+                </a:solidFill>
+              </a14:hiddenFill>
+            </a:ext>
+          </a:extLst>
+        </p:spPr>
+      </p:pic>
+      <p:pic>
+        <p:nvPicPr>
+          <p:cNvPr id="1032" name="Picture 8" descr="Principales redes sociales y cuál nos interesa más para nuestro negocio -">
+            <a:extLst>
+              <a:ext uri="{FF2B5EF4-FFF2-40B4-BE49-F238E27FC236}">
+                <a16:creationId xmlns:a16="http://schemas.microsoft.com/office/drawing/2014/main" id="{B0F62343-883E-C8C3-7064-7ADE36CF8E2E}"/>
+              </a:ext>
+            </a:extLst>
+          </p:cNvPr>
+          <p:cNvPicPr>
+            <a:picLocks noChangeAspect="1" noChangeArrowheads="1"/>
+          </p:cNvPicPr>
+          <p:nvPr/>
+        </p:nvPicPr>
+        <p:blipFill>
+          <a:blip r:embed="rId7" cstate="print">
+            <a:extLst>
+              <a:ext uri="{28A0092B-C50C-407E-A947-70E740481C1C}">
+                <a14:useLocalDpi xmlns:a14="http://schemas.microsoft.com/office/drawing/2010/main" val="0"/>
+              </a:ext>
+            </a:extLst>
+          </a:blip>
+          <a:srcRect/>
+          <a:stretch>
+            <a:fillRect/>
+          </a:stretch>
+        </p:blipFill>
+        <p:spPr bwMode="auto">
+          <a:xfrm>
+            <a:off x="8444552" y="4505003"/>
+            <a:ext cx="2715143" cy="1810095"/>
+          </a:xfrm>
+          <a:prstGeom prst="rect">
+            <a:avLst/>
+          </a:prstGeom>
+          <a:noFill/>
+          <a:extLst>
+            <a:ext uri="{909E8E84-426E-40DD-AFC4-6F175D3DCCD1}">
+              <a14:hiddenFill xmlns:a14="http://schemas.microsoft.com/office/drawing/2010/main">
+                <a:solidFill>
+                  <a:srgbClr val="FFFFFF"/>
+                </a:solidFill>
+              </a14:hiddenFill>
+            </a:ext>
+          </a:extLst>
+        </p:spPr>
+      </p:pic>
+    </p:spTree>
+    <p:extLst>
+      <p:ext uri="{BB962C8B-B14F-4D97-AF65-F5344CB8AC3E}">
+        <p14:creationId xmlns:p14="http://schemas.microsoft.com/office/powerpoint/2010/main" val="115281219"/>
+      </p:ext>
+    </p:extLst>
+  </p:cSld>
+  <p:clrMapOvr>
+    <a:masterClrMapping/>
+  </p:clrMapOvr>
+  <mc:AlternateContent xmlns:mc="http://schemas.openxmlformats.org/markup-compatibility/2006">
+    <mc:Choice xmlns:p14="http://schemas.microsoft.com/office/powerpoint/2010/main" Requires="p14">
+      <p:transition spd="med" p14:dur="700">
+        <p:fade/>
+      </p:transition>
+    </mc:Choice>
+    <mc:Fallback>
+      <p:transition spd="med">
+        <p:fade/>
+      </p:transition>
+    </mc:Fallback>
+  </mc:AlternateContent>
+</p:sld>
+</file>
+
+<file path=ppt/slides/slide16.xml><?xml version="1.0" encoding="utf-8"?>
+<p:sld xmlns:a="http://schemas.openxmlformats.org/drawingml/2006/main" xmlns:r="http://schemas.openxmlformats.org/officeDocument/2006/relationships" xmlns:p="http://schemas.openxmlformats.org/presentationml/2006/main">
+  <p:cSld>
     <p:spTree>
       <p:nvGrpSpPr>
         <p:cNvPr id="1" name=""/>
@@ -11492,13 +12223,13 @@
         </p:nvSpPr>
         <p:spPr>
           <a:xfrm>
-            <a:off x="2592924" y="2133599"/>
-            <a:ext cx="8911687" cy="4123765"/>
+            <a:off x="1986254" y="1219199"/>
+            <a:ext cx="9390992" cy="4777155"/>
           </a:xfrm>
         </p:spPr>
         <p:txBody>
           <a:bodyPr rtlCol="0">
-            <a:normAutofit fontScale="92500" lnSpcReduction="20000"/>
+            <a:normAutofit fontScale="85000" lnSpcReduction="20000"/>
           </a:bodyPr>
           <a:lstStyle/>
           <a:p>
@@ -11610,6 +12341,36 @@
               </a:rPr>
               <a:t>Consulta de historial</a:t>
             </a:r>
+          </a:p>
+          <a:p>
+            <a:r>
+              <a:rPr lang="es-ES" sz="2500" dirty="0">
+                <a:solidFill>
+                  <a:schemeClr val="bg1"/>
+                </a:solidFill>
+                <a:latin typeface="Baskerville"/>
+              </a:rPr>
+              <a:t>Demostración de la APP</a:t>
+            </a:r>
+          </a:p>
+          <a:p>
+            <a:r>
+              <a:rPr lang="es-ES" sz="2500" dirty="0">
+                <a:solidFill>
+                  <a:schemeClr val="bg1"/>
+                </a:solidFill>
+                <a:latin typeface="Baskerville"/>
+              </a:rPr>
+              <a:t>Implantaciones futuras</a:t>
+            </a:r>
+          </a:p>
+          <a:p>
+            <a:endParaRPr lang="es-ES" sz="2500" dirty="0">
+              <a:solidFill>
+                <a:schemeClr val="bg1"/>
+              </a:solidFill>
+              <a:latin typeface="Baskerville"/>
+            </a:endParaRPr>
           </a:p>
           <a:p>
             <a:endParaRPr lang="es-ES" sz="2500" dirty="0">
@@ -12317,13 +13078,13 @@
   <p:clrMapOvr>
     <a:masterClrMapping/>
   </p:clrMapOvr>
-  <mc:AlternateContent xmlns:mc="http://schemas.openxmlformats.org/markup-compatibility/2006">
-    <mc:Choice xmlns:p14="http://schemas.microsoft.com/office/powerpoint/2010/main" Requires="p14">
+  <mc:AlternateContent xmlns:mc="http://schemas.openxmlformats.org/markup-compatibility/2006" xmlns:p14="http://schemas.microsoft.com/office/powerpoint/2010/main">
+    <mc:Choice Requires="p14">
       <p:transition spd="med" p14:dur="700">
         <p:fade/>
       </p:transition>
     </mc:Choice>
-    <mc:Fallback>
+    <mc:Fallback xmlns="">
       <p:transition spd="med">
         <p:fade/>
       </p:transition>

</xml_diff>